<commit_message>
Fix pptx by API call error
</commit_message>
<xml_diff>
--- a/src/lib/output/GeneratedPresentation.pptx
+++ b/src/lib/output/GeneratedPresentation.pptx
@@ -3182,7 +3182,7 @@
           <a:lstStyle/>
           <a:p>
             <a:r>
-              <a:t>Confidential — For client internal use only</a:t>
+              <a:t>Confidential – For client internal use only</a:t>
             </a:r>
           </a:p>
           <a:p>
@@ -3215,7 +3215,7 @@
           <a:lstStyle/>
           <a:p>
             <a:r>
-              <a:t>[Today's Date]</a:t>
+              <a:t>[Today’s Date]</a:t>
             </a:r>
           </a:p>
         </p:txBody>
@@ -3399,7 +3399,7 @@
           <a:lstStyle/>
           <a:p>
             <a:r>
-              <a:t>Risks</a:t>
+              <a:t>Top Risks</a:t>
             </a:r>
           </a:p>
         </p:txBody>
@@ -3427,7 +3427,7 @@
           <a:lstStyle/>
           <a:p>
             <a:r>
-              <a:t>Upfront investment, data security, workforce transition. goes here. Explain the key point succinctly.</a:t>
+              <a:t>Data security, workforce transition, change resistance, ROI realization. goes here. Explain the key point succinctly.</a:t>
             </a:r>
           </a:p>
         </p:txBody>
@@ -3691,7 +3691,7 @@
           <a:lstStyle/>
           <a:p>
             <a:r>
-              <a:t>Approve pilot, schedule kickoff, grant data access, identify stakeholders. for section 3 content. Elaborate on the subject matter.</a:t>
+              <a:t>Confirm sponsorship, schedule kickoff, provide data access, and align key stakeholders for pilot launch. for section 3 content. Elaborate on the subject matter.</a:t>
             </a:r>
           </a:p>
         </p:txBody>
@@ -3988,30 +3988,30 @@
           </a:p>
           <a:p>
             <a:r>
-              <a:t>Current context: Rapid digital transformation, rising customer expectations, and competitive pressure.</a:t>
+              <a:t>Current context: Increasing market competition, rising operational costs, and demand for faster, data-driven decisions.</a:t>
             </a:r>
           </a:p>
           <a:p/>
           <a:p>
             <a:r>
-              <a:t>Key constraints: Legacy systems, data silos, and talent gaps.</a:t>
+              <a:t>Key constraints: Upfront investment ($2M+), data security, and workforce readiness.</a:t>
             </a:r>
           </a:p>
           <a:p/>
           <a:p>
             <a:r>
-              <a:t>Objectives: Achieve 12% revenue uplift, 25–40% cost savings, and faster decision-making.</a:t>
+              <a:t>Objectives: Achieve 12% revenue uplift in year one, reduce costs by 25–40%, and accelerate decision-making by 2–3x.</a:t>
             </a:r>
           </a:p>
           <a:p/>
           <a:p>
             <a:r>
-              <a:t>In scope: Customer support, sales forecasting, and process automation.</a:t>
-            </a:r>
-          </a:p>
-          <a:p>
-            <a:r>
-              <a:t>Out of scope: Full IT infrastructure overhaul.. Describe the image on the left or provide insight into the subject. Use multiple sentences to occupy the space and demonstrate alignment.</a:t>
+              <a:t>In scope: Customer support, sales forecasting, and operational automation.</a:t>
+            </a:r>
+          </a:p>
+          <a:p>
+            <a:r>
+              <a:t>Out of scope: Non-core business units in phase one.. Describe the image on the left or provide insight into the subject. Use multiple sentences to occupy the space and demonstrate alignment.</a:t>
             </a:r>
           </a:p>
         </p:txBody>
@@ -4199,7 +4199,7 @@
           <a:lstStyle/>
           <a:p>
             <a:r>
-              <a:t>90-day pilot (targeted use case) Use succinct language to guide your audience.</a:t>
+              <a:t>90-day pilot: Identify high-impact use cases, rapid prototyping, and stakeholder workshops. Use succinct language to guide your audience.</a:t>
             </a:r>
           </a:p>
         </p:txBody>
@@ -4331,7 +4331,7 @@
           <a:lstStyle/>
           <a:p>
             <a:r>
-              <a:t>6-month scale-up (expand to 2–3 functions) Use succinct language to guide your audience.</a:t>
+              <a:t>6-month scale-up: Expand to additional functions, integrate with existing systems, and conduct training. Use succinct language to guide your audience.</a:t>
             </a:r>
           </a:p>
         </p:txBody>
@@ -4463,7 +4463,7 @@
           <a:lstStyle/>
           <a:p>
             <a:r>
-              <a:t>Enterprise rollout (year two) Use succinct language to guide your audience.</a:t>
+              <a:t>Year 2 enterprise rollout: Full deployment, change management, and benefits tracking. Use succinct language to guide your audience.</a:t>
             </a:r>
           </a:p>
         </p:txBody>
@@ -4595,7 +4595,7 @@
           <a:lstStyle/>
           <a:p>
             <a:r>
-              <a:t>Methods: Stakeholder interviews, data analysis, rapid prototyping, and workshops. Collaboration: Joint client-consultant teams to accelerate learning and de-risk delivery. Use succinct language to guide your audience.</a:t>
+              <a:t>Methods: Data analysis, process mapping, AI tool selection, and collaborative sprints with client teams. Use succinct language to guide your audience.</a:t>
             </a:r>
           </a:p>
         </p:txBody>
@@ -4783,7 +4783,7 @@
           <a:lstStyle/>
           <a:p>
             <a:r>
-              <a:t>Week 1–2: Stakeholder alignment &amp; data access Use succinct language to guide your audience.</a:t>
+              <a:t>Week 1–4: Use case selection, data readiness assessment Use succinct language to guide your audience.</a:t>
             </a:r>
           </a:p>
         </p:txBody>
@@ -4915,7 +4915,7 @@
           <a:lstStyle/>
           <a:p>
             <a:r>
-              <a:t>Week 3–12: Pilot implementation &amp; review Use succinct language to guide your audience.</a:t>
+              <a:t>Week 5–12: Pilot implementation, initial results review Use succinct language to guide your audience.</a:t>
             </a:r>
           </a:p>
         </p:txBody>
@@ -5047,7 +5047,7 @@
           <a:lstStyle/>
           <a:p>
             <a:r>
-              <a:t>Month 4–9: Scale-up to additional functions Use succinct language to guide your audience.</a:t>
+              <a:t>Month 4–9: Scale-up to core functions, user training Use succinct language to guide your audience.</a:t>
             </a:r>
           </a:p>
         </p:txBody>
@@ -5179,7 +5179,7 @@
           <a:lstStyle/>
           <a:p>
             <a:r>
-              <a:t>Month 10–24: Enterprise rollout Use succinct language to guide your audience.</a:t>
+              <a:t>Month 10–24: Enterprise rollout, continuous improvement Use succinct language to guide your audience.</a:t>
             </a:r>
           </a:p>
         </p:txBody>
@@ -5363,7 +5363,7 @@
           <a:lstStyle/>
           <a:p>
             <a:r>
-              <a:t>Deliverables</a:t>
+              <a:t>Key Deliverables</a:t>
             </a:r>
           </a:p>
         </p:txBody>
@@ -5391,7 +5391,7 @@
           <a:lstStyle/>
           <a:p>
             <a:r>
-              <a:t>AI pilot report, implementation roadmap, training materials, and business case. goes here. Explain the key point succinctly.</a:t>
+              <a:t>AI pilot report, implementation roadmap, training materials, and benefits realization dashboard. goes here. Explain the key point succinctly.</a:t>
             </a:r>
           </a:p>
         </p:txBody>
@@ -5655,7 +5655,7 @@
           <a:lstStyle/>
           <a:p>
             <a:r>
-              <a:t>Benefits tracked via quarterly business reviews. for section 3 content. Elaborate on the subject matter.</a:t>
+              <a:t>Benefits tracked via quarterly KPI reviews and post-implementation surveys. for section 3 content. Elaborate on the subject matter.</a:t>
             </a:r>
           </a:p>
         </p:txBody>
@@ -5867,7 +5867,7 @@
           <a:lstStyle/>
           <a:p>
             <a:r>
-              <a:t>AI strategy lead, data scientist, change manager. goes here. Explain the key point succinctly.</a:t>
+              <a:t>AI strategy lead, data scientist, change manager, project manager. goes here. Explain the key point succinctly.</a:t>
             </a:r>
           </a:p>
         </p:txBody>
@@ -6131,7 +6131,7 @@
           <a:lstStyle/>
           <a:p>
             <a:r>
-              <a:t>RACI: Consultants (design, delivery), Client (data, adoption). Working norms: Weekly stand-ups, Slack/Teams for comms, 24-hour response time. for section 3 content. Elaborate on the subject matter.</a:t>
+              <a:t>RACI: Consultants drive analysis and implementation; client leads provide data and champion adoption. Weekly check-ins, Slack/Teams for daily comms, 24-hour response SLA, shared project workspace. for section 3 content. Elaborate on the subject matter.</a:t>
             </a:r>
           </a:p>
         </p:txBody>
@@ -6315,7 +6315,7 @@
           <a:lstStyle/>
           <a:p>
             <a:r>
-              <a:t>Case 1: Fortune 500 retailer</a:t>
+              <a:t>Case 1: Customer Support Automation</a:t>
             </a:r>
           </a:p>
         </p:txBody>
@@ -6343,7 +6343,7 @@
           <a:lstStyle/>
           <a:p>
             <a:r>
-              <a:t>AI-driven customer support, 40% reduction in ticket time, $5M annual savings. goes here. Explain the key point succinctly.</a:t>
+              <a:t>Fortune 500 client automated customer support, reducing ticket handling time by 40% and saving $4M/year. goes here. Explain the key point succinctly.</a:t>
             </a:r>
           </a:p>
         </p:txBody>
@@ -6447,7 +6447,7 @@
           <a:lstStyle/>
           <a:p>
             <a:r>
-              <a:t>Case 2: Global manufacturer</a:t>
+              <a:t>Case 2: AI Sales Forecasting</a:t>
             </a:r>
           </a:p>
         </p:txBody>
@@ -6475,7 +6475,7 @@
           <a:lstStyle/>
           <a:p>
             <a:r>
-              <a:t>Case 2: Global manufacturer content goes here. Provide additional details or context.</a:t>
+              <a:t>Case 2: AI Sales Forecasting content goes here. Provide additional details or context.</a:t>
             </a:r>
           </a:p>
         </p:txBody>
@@ -6579,7 +6579,7 @@
           <a:lstStyle/>
           <a:p>
             <a:r>
-              <a:t>References</a:t>
+              <a:t>Additional Notes</a:t>
             </a:r>
           </a:p>
         </p:txBody>
@@ -6607,7 +6607,7 @@
           <a:lstStyle/>
           <a:p>
             <a:r>
-              <a:t>References available upon request. for section 3 content. Elaborate on the subject matter.</a:t>
+              <a:t>Testimonials available upon request. All cases delivered with robust data security and workforce transition plans. for section 3 content. Elaborate on the subject matter.</a:t>
             </a:r>
           </a:p>
         </p:txBody>
@@ -6700,24 +6700,20 @@
         </p:nvSpPr>
         <p:spPr>
           <a:xfrm>
-            <a:off x="777240" y="1234440"/>
-            <a:ext cx="8092440" cy="365760"/>
-          </a:xfrm>
-          <a:prstGeom prst="rect">
-            <a:avLst/>
-          </a:prstGeom>
-          <a:noFill/>
-        </p:spPr>
-        <p:txBody>
-          <a:bodyPr wrap="none">
-            <a:spAutoFit/>
-          </a:bodyPr>
-          <a:lstStyle/>
-          <a:p>
-            <a:r>
-              <a:t>Pricing: $2M+ upfront investment (pilot + scale-up), hybrid model. Includes consulting, implementation, training. Assumptions: Timely data access, client-side project manager.</a:t>
-            </a:r>
-          </a:p>
+            <a:off x="274320" y="1143000"/>
+            <a:ext cx="2682240" cy="2743200"/>
+          </a:xfrm>
+          <a:prstGeom prst="rect">
+            <a:avLst/>
+          </a:prstGeom>
+          <a:noFill/>
+        </p:spPr>
+        <p:txBody>
+          <a:bodyPr wrap="none">
+            <a:spAutoFit/>
+          </a:bodyPr>
+          <a:lstStyle/>
+          <a:p/>
         </p:txBody>
       </p:sp>
       <p:sp>
@@ -6728,24 +6724,20 @@
         </p:nvSpPr>
         <p:spPr>
           <a:xfrm>
-            <a:off x="777240" y="1965960"/>
-            <a:ext cx="8092440" cy="365760"/>
-          </a:xfrm>
-          <a:prstGeom prst="rect">
-            <a:avLst/>
-          </a:prstGeom>
-          <a:noFill/>
-        </p:spPr>
-        <p:txBody>
-          <a:bodyPr wrap="none">
-            <a:spAutoFit/>
-          </a:bodyPr>
-          <a:lstStyle/>
-          <a:p>
-            <a:r>
-              <a:t>Payment: 40% upfront, 30% at scale-up, 30% at rollout. Change control for scope adjustments.</a:t>
-            </a:r>
-          </a:p>
+            <a:off x="1386840" y="1371600"/>
+            <a:ext cx="457200" cy="457200"/>
+          </a:xfrm>
+          <a:prstGeom prst="rect">
+            <a:avLst/>
+          </a:prstGeom>
+          <a:noFill/>
+        </p:spPr>
+        <p:txBody>
+          <a:bodyPr wrap="none">
+            <a:spAutoFit/>
+          </a:bodyPr>
+          <a:lstStyle/>
+          <a:p/>
         </p:txBody>
       </p:sp>
       <p:sp>
@@ -6756,8 +6748,92 @@
         </p:nvSpPr>
         <p:spPr>
           <a:xfrm>
-            <a:off x="777240" y="2697480"/>
-            <a:ext cx="8092440" cy="365760"/>
+            <a:off x="1386840" y="1371600"/>
+            <a:ext cx="457200" cy="457200"/>
+          </a:xfrm>
+          <a:prstGeom prst="rect">
+            <a:avLst/>
+          </a:prstGeom>
+          <a:noFill/>
+        </p:spPr>
+        <p:txBody>
+          <a:bodyPr wrap="none">
+            <a:spAutoFit/>
+          </a:bodyPr>
+          <a:lstStyle/>
+          <a:p>
+            <a:r>
+              <a:t>1</a:t>
+            </a:r>
+          </a:p>
+        </p:txBody>
+      </p:sp>
+      <p:sp>
+        <p:nvSpPr>
+          <p:cNvPr id="8" name="TextBox 7"/>
+          <p:cNvSpPr txBox="1"/>
+          <p:nvPr/>
+        </p:nvSpPr>
+        <p:spPr>
+          <a:xfrm>
+            <a:off x="411480" y="1920240"/>
+            <a:ext cx="2407920" cy="365760"/>
+          </a:xfrm>
+          <a:prstGeom prst="rect">
+            <a:avLst/>
+          </a:prstGeom>
+          <a:noFill/>
+        </p:spPr>
+        <p:txBody>
+          <a:bodyPr wrap="none">
+            <a:spAutoFit/>
+          </a:bodyPr>
+          <a:lstStyle/>
+          <a:p>
+            <a:r>
+              <a:t>Pricing</a:t>
+            </a:r>
+          </a:p>
+        </p:txBody>
+      </p:sp>
+      <p:sp>
+        <p:nvSpPr>
+          <p:cNvPr id="9" name="TextBox 8"/>
+          <p:cNvSpPr txBox="1"/>
+          <p:nvPr/>
+        </p:nvSpPr>
+        <p:spPr>
+          <a:xfrm>
+            <a:off x="411480" y="2286000"/>
+            <a:ext cx="2407920" cy="1417320"/>
+          </a:xfrm>
+          <a:prstGeom prst="rect">
+            <a:avLst/>
+          </a:prstGeom>
+          <a:noFill/>
+        </p:spPr>
+        <p:txBody>
+          <a:bodyPr wrap="none">
+            <a:spAutoFit/>
+          </a:bodyPr>
+          <a:lstStyle/>
+          <a:p>
+            <a:r>
+              <a:t>$2M+ upfront investment for pilot and scale-up, with flexible payment milestones. goes here. Explain the key point succinctly.</a:t>
+            </a:r>
+          </a:p>
+        </p:txBody>
+      </p:sp>
+      <p:sp>
+        <p:nvSpPr>
+          <p:cNvPr id="10" name="TextBox 9"/>
+          <p:cNvSpPr txBox="1"/>
+          <p:nvPr/>
+        </p:nvSpPr>
+        <p:spPr>
+          <a:xfrm>
+            <a:off x="3230880" y="1143000"/>
+            <a:ext cx="2682240" cy="2743200"/>
           </a:xfrm>
           <a:prstGeom prst="rect">
             <a:avLst/>
@@ -6770,6 +6846,246 @@
           </a:bodyPr>
           <a:lstStyle/>
           <a:p/>
+        </p:txBody>
+      </p:sp>
+      <p:sp>
+        <p:nvSpPr>
+          <p:cNvPr id="11" name="TextBox 10"/>
+          <p:cNvSpPr txBox="1"/>
+          <p:nvPr/>
+        </p:nvSpPr>
+        <p:spPr>
+          <a:xfrm>
+            <a:off x="4343400" y="1371600"/>
+            <a:ext cx="457200" cy="457200"/>
+          </a:xfrm>
+          <a:prstGeom prst="rect">
+            <a:avLst/>
+          </a:prstGeom>
+          <a:noFill/>
+        </p:spPr>
+        <p:txBody>
+          <a:bodyPr wrap="none">
+            <a:spAutoFit/>
+          </a:bodyPr>
+          <a:lstStyle/>
+          <a:p/>
+        </p:txBody>
+      </p:sp>
+      <p:sp>
+        <p:nvSpPr>
+          <p:cNvPr id="12" name="TextBox 11"/>
+          <p:cNvSpPr txBox="1"/>
+          <p:nvPr/>
+        </p:nvSpPr>
+        <p:spPr>
+          <a:xfrm>
+            <a:off x="4343400" y="1371600"/>
+            <a:ext cx="457200" cy="457200"/>
+          </a:xfrm>
+          <a:prstGeom prst="rect">
+            <a:avLst/>
+          </a:prstGeom>
+          <a:noFill/>
+        </p:spPr>
+        <p:txBody>
+          <a:bodyPr wrap="none">
+            <a:spAutoFit/>
+          </a:bodyPr>
+          <a:lstStyle/>
+          <a:p>
+            <a:r>
+              <a:t>2</a:t>
+            </a:r>
+          </a:p>
+        </p:txBody>
+      </p:sp>
+      <p:sp>
+        <p:nvSpPr>
+          <p:cNvPr id="13" name="TextBox 12"/>
+          <p:cNvSpPr txBox="1"/>
+          <p:nvPr/>
+        </p:nvSpPr>
+        <p:spPr>
+          <a:xfrm>
+            <a:off x="3368040" y="1920240"/>
+            <a:ext cx="2407920" cy="365760"/>
+          </a:xfrm>
+          <a:prstGeom prst="rect">
+            <a:avLst/>
+          </a:prstGeom>
+          <a:noFill/>
+        </p:spPr>
+        <p:txBody>
+          <a:bodyPr wrap="none">
+            <a:spAutoFit/>
+          </a:bodyPr>
+          <a:lstStyle/>
+          <a:p>
+            <a:r>
+              <a:t>Assumptions</a:t>
+            </a:r>
+          </a:p>
+        </p:txBody>
+      </p:sp>
+      <p:sp>
+        <p:nvSpPr>
+          <p:cNvPr id="14" name="TextBox 13"/>
+          <p:cNvSpPr txBox="1"/>
+          <p:nvPr/>
+        </p:nvSpPr>
+        <p:spPr>
+          <a:xfrm>
+            <a:off x="3368040" y="2286000"/>
+            <a:ext cx="2407920" cy="1417320"/>
+          </a:xfrm>
+          <a:prstGeom prst="rect">
+            <a:avLst/>
+          </a:prstGeom>
+          <a:noFill/>
+        </p:spPr>
+        <p:txBody>
+          <a:bodyPr wrap="none">
+            <a:spAutoFit/>
+          </a:bodyPr>
+          <a:lstStyle/>
+          <a:p>
+            <a:r>
+              <a:t>Assumptions content goes here. Provide additional details or context.</a:t>
+            </a:r>
+          </a:p>
+        </p:txBody>
+      </p:sp>
+      <p:sp>
+        <p:nvSpPr>
+          <p:cNvPr id="15" name="TextBox 14"/>
+          <p:cNvSpPr txBox="1"/>
+          <p:nvPr/>
+        </p:nvSpPr>
+        <p:spPr>
+          <a:xfrm>
+            <a:off x="6187440" y="1143000"/>
+            <a:ext cx="2682240" cy="2743200"/>
+          </a:xfrm>
+          <a:prstGeom prst="rect">
+            <a:avLst/>
+          </a:prstGeom>
+          <a:noFill/>
+        </p:spPr>
+        <p:txBody>
+          <a:bodyPr wrap="none">
+            <a:spAutoFit/>
+          </a:bodyPr>
+          <a:lstStyle/>
+          <a:p/>
+        </p:txBody>
+      </p:sp>
+      <p:sp>
+        <p:nvSpPr>
+          <p:cNvPr id="16" name="TextBox 15"/>
+          <p:cNvSpPr txBox="1"/>
+          <p:nvPr/>
+        </p:nvSpPr>
+        <p:spPr>
+          <a:xfrm>
+            <a:off x="7299960" y="1371600"/>
+            <a:ext cx="457200" cy="457200"/>
+          </a:xfrm>
+          <a:prstGeom prst="rect">
+            <a:avLst/>
+          </a:prstGeom>
+          <a:noFill/>
+        </p:spPr>
+        <p:txBody>
+          <a:bodyPr wrap="none">
+            <a:spAutoFit/>
+          </a:bodyPr>
+          <a:lstStyle/>
+          <a:p/>
+        </p:txBody>
+      </p:sp>
+      <p:sp>
+        <p:nvSpPr>
+          <p:cNvPr id="17" name="TextBox 16"/>
+          <p:cNvSpPr txBox="1"/>
+          <p:nvPr/>
+        </p:nvSpPr>
+        <p:spPr>
+          <a:xfrm>
+            <a:off x="7299960" y="1371600"/>
+            <a:ext cx="457200" cy="457200"/>
+          </a:xfrm>
+          <a:prstGeom prst="rect">
+            <a:avLst/>
+          </a:prstGeom>
+          <a:noFill/>
+        </p:spPr>
+        <p:txBody>
+          <a:bodyPr wrap="none">
+            <a:spAutoFit/>
+          </a:bodyPr>
+          <a:lstStyle/>
+          <a:p>
+            <a:r>
+              <a:t>3</a:t>
+            </a:r>
+          </a:p>
+        </p:txBody>
+      </p:sp>
+      <p:sp>
+        <p:nvSpPr>
+          <p:cNvPr id="18" name="TextBox 17"/>
+          <p:cNvSpPr txBox="1"/>
+          <p:nvPr/>
+        </p:nvSpPr>
+        <p:spPr>
+          <a:xfrm>
+            <a:off x="6324600" y="1920240"/>
+            <a:ext cx="2407920" cy="365760"/>
+          </a:xfrm>
+          <a:prstGeom prst="rect">
+            <a:avLst/>
+          </a:prstGeom>
+          <a:noFill/>
+        </p:spPr>
+        <p:txBody>
+          <a:bodyPr wrap="none">
+            <a:spAutoFit/>
+          </a:bodyPr>
+          <a:lstStyle/>
+          <a:p>
+            <a:r>
+              <a:t>Terms</a:t>
+            </a:r>
+          </a:p>
+        </p:txBody>
+      </p:sp>
+      <p:sp>
+        <p:nvSpPr>
+          <p:cNvPr id="19" name="TextBox 18"/>
+          <p:cNvSpPr txBox="1"/>
+          <p:nvPr/>
+        </p:nvSpPr>
+        <p:spPr>
+          <a:xfrm>
+            <a:off x="6324600" y="2286000"/>
+            <a:ext cx="2407920" cy="1417320"/>
+          </a:xfrm>
+          <a:prstGeom prst="rect">
+            <a:avLst/>
+          </a:prstGeom>
+          <a:noFill/>
+        </p:spPr>
+        <p:txBody>
+          <a:bodyPr wrap="none">
+            <a:spAutoFit/>
+          </a:bodyPr>
+          <a:lstStyle/>
+          <a:p>
+            <a:r>
+              <a:t>Standard consulting agreement, monthly invoicing, change control for scope adjustments. for section 3 content. Elaborate on the subject matter.</a:t>
+            </a:r>
+          </a:p>
         </p:txBody>
       </p:sp>
     </p:spTree>

</xml_diff>